<commit_message>
Incorporación de links de drive
</commit_message>
<xml_diff>
--- a/9) Introduction to git and Github/Introducción a git y Github.pptx
+++ b/9) Introduction to git and Github/Introducción a git y Github.pptx
@@ -5,10 +5,11 @@
     <p:sldMasterId id="2147483648" r:id="rId1"/>
   </p:sldMasterIdLst>
   <p:notesMasterIdLst>
-    <p:notesMasterId r:id="rId5"/>
+    <p:notesMasterId r:id="rId6"/>
   </p:notesMasterIdLst>
   <p:sldIdLst>
     <p:sldId id="256" r:id="rId4"/>
+    <p:sldId id="257" r:id="rId5"/>
   </p:sldIdLst>
   <p:sldSz cx="12192000" cy="6858000"/>
   <p:notesSz cx="6858000" cy="9144000"/>
@@ -566,6 +567,88 @@
               <a:t>1</a:t>
             </a:fld>
             <a:endParaRPr lang="es-ES"/>
+          </a:p>
+        </p:txBody>
+      </p:sp>
+    </p:spTree>
+  </p:cSld>
+</p:notes>
+</file>
+
+<file path=ppt/notesSlides/notesSlide2.xml><?xml version="1.0" encoding="utf-8"?>
+<p:notes xmlns:a="http://schemas.openxmlformats.org/drawingml/2006/main" xmlns:r="http://schemas.openxmlformats.org/officeDocument/2006/relationships" xmlns:p="http://schemas.openxmlformats.org/presentationml/2006/main" xmlns:m="http://schemas.openxmlformats.org/officeDocument/2006/math" xmlns:w="http://schemas.openxmlformats.org/wordprocessingml/2006/main">
+  <p:cSld name="">
+    <p:spTree>
+      <p:nvGrpSpPr>
+        <p:cNvPr id="1" name=""/>
+        <p:cNvGrpSpPr/>
+        <p:nvPr/>
+      </p:nvGrpSpPr>
+      <p:grpSpPr bwMode="auto">
+        <a:xfrm>
+          <a:off x="0" y="0"/>
+          <a:ext cx="0" cy="0"/>
+          <a:chOff x="0" y="0"/>
+          <a:chExt cx="0" cy="0"/>
+        </a:xfrm>
+      </p:grpSpPr>
+      <p:sp>
+        <p:nvSpPr>
+          <p:cNvPr id="2" name="Slide Image Placeholder 1"/>
+          <p:cNvSpPr>
+            <a:spLocks noChangeAspect="1" noGrp="1" noRot="1"/>
+          </p:cNvSpPr>
+          <p:nvPr>
+            <p:ph type="sldImg"/>
+          </p:nvPr>
+        </p:nvSpPr>
+        <p:spPr bwMode="auto"/>
+      </p:sp>
+      <p:sp>
+        <p:nvSpPr>
+          <p:cNvPr id="3" name="Notes Placeholder 2"/>
+          <p:cNvSpPr>
+            <a:spLocks noGrp="1"/>
+          </p:cNvSpPr>
+          <p:nvPr>
+            <p:ph type="body" idx="1"/>
+          </p:nvPr>
+        </p:nvSpPr>
+        <p:spPr bwMode="auto"/>
+        <p:txBody>
+          <a:bodyPr/>
+          <a:lstStyle/>
+          <a:p>
+            <a:pPr>
+              <a:defRPr/>
+            </a:pPr>
+            <a:endParaRPr/>
+          </a:p>
+        </p:txBody>
+      </p:sp>
+      <p:sp>
+        <p:nvSpPr>
+          <p:cNvPr id="4" name="Slide Number Placeholder 3"/>
+          <p:cNvSpPr>
+            <a:spLocks noGrp="1"/>
+          </p:cNvSpPr>
+          <p:nvPr>
+            <p:ph type="sldNum" sz="quarter" idx="10"/>
+          </p:nvPr>
+        </p:nvSpPr>
+        <p:spPr bwMode="auto"/>
+        <p:txBody>
+          <a:bodyPr/>
+          <a:lstStyle/>
+          <a:p>
+            <a:pPr>
+              <a:defRPr/>
+            </a:pPr>
+            <a:fld id="{C2D1B4C8-5627-24D0-7021-77435EAE2D74}" type="slidenum">
+              <a:rPr/>
+              <a:t/>
+            </a:fld>
+            <a:endParaRPr/>
           </a:p>
         </p:txBody>
       </p:sp>
@@ -3708,6 +3791,87 @@
               <a:defRPr/>
             </a:pPr>
             <a:endParaRPr lang="es-ES"/>
+          </a:p>
+        </p:txBody>
+      </p:sp>
+    </p:spTree>
+  </p:cSld>
+  <p:clrMapOvr>
+    <a:masterClrMapping/>
+  </p:clrMapOvr>
+  <mc:AlternateContent xmlns:mc="http://schemas.openxmlformats.org/markup-compatibility/2006">
+    <mc:Choice xmlns:p159="http://schemas.microsoft.com/office/powerpoint/2015/09/main" xmlns:p14="http://schemas.microsoft.com/office/powerpoint/2010/main" Requires="p159">
+      <p:transition p14:dur="2000" advClick="1"/>
+    </mc:Choice>
+    <mc:Fallback>
+      <p:transition advClick="1"/>
+    </mc:Fallback>
+  </mc:AlternateContent>
+</p:sld>
+</file>
+
+<file path=ppt/slides/slide2.xml><?xml version="1.0" encoding="utf-8"?>
+<p:sld xmlns:a="http://schemas.openxmlformats.org/drawingml/2006/main" xmlns:r="http://schemas.openxmlformats.org/officeDocument/2006/relationships" xmlns:p="http://schemas.openxmlformats.org/presentationml/2006/main" xmlns:m="http://schemas.openxmlformats.org/officeDocument/2006/math" xmlns:w="http://schemas.openxmlformats.org/wordprocessingml/2006/main" xmlns:mc="http://schemas.openxmlformats.org/markup-compatibility/2006" showMasterPhAnim="0" showMasterSp="1" show="1">
+  <p:cSld name="">
+    <p:spTree>
+      <p:nvGrpSpPr>
+        <p:cNvPr id="1" name=""/>
+        <p:cNvGrpSpPr/>
+        <p:nvPr/>
+      </p:nvGrpSpPr>
+      <p:grpSpPr bwMode="auto">
+        <a:xfrm>
+          <a:off x="0" y="0"/>
+          <a:ext cx="0" cy="0"/>
+          <a:chOff x="0" y="0"/>
+          <a:chExt cx="0" cy="0"/>
+        </a:xfrm>
+      </p:grpSpPr>
+      <p:sp>
+        <p:nvSpPr>
+          <p:cNvPr id="524341360" name="Title 1"/>
+          <p:cNvSpPr>
+            <a:spLocks noGrp="1"/>
+          </p:cNvSpPr>
+          <p:nvPr>
+            <p:ph type="title"/>
+          </p:nvPr>
+        </p:nvSpPr>
+        <p:spPr bwMode="auto"/>
+        <p:txBody>
+          <a:bodyPr/>
+          <a:lstStyle/>
+          <a:p>
+            <a:pPr>
+              <a:defRPr/>
+            </a:pPr>
+            <a:r>
+              <a:rPr/>
+              <a:t>Links</a:t>
+            </a:r>
+            <a:endParaRPr/>
+          </a:p>
+        </p:txBody>
+      </p:sp>
+      <p:sp>
+        <p:nvSpPr>
+          <p:cNvPr id="578522682" name="Marcador de contenido 2"/>
+          <p:cNvSpPr>
+            <a:spLocks noGrp="1"/>
+          </p:cNvSpPr>
+          <p:nvPr>
+            <p:ph idx="1"/>
+          </p:nvPr>
+        </p:nvSpPr>
+        <p:spPr bwMode="auto"/>
+        <p:txBody>
+          <a:bodyPr/>
+          <a:lstStyle/>
+          <a:p>
+            <a:pPr>
+              <a:defRPr/>
+            </a:pPr>
+            <a:endParaRPr/>
           </a:p>
         </p:txBody>
       </p:sp>

</xml_diff>